<commit_message>
maj diagramme d'exigence et classe et diapo
</commit_message>
<xml_diff>
--- a/documentation/oral/Diapo projetDMX.pptx
+++ b/documentation/oral/Diapo projetDMX.pptx
@@ -13,13 +13,13 @@
     <p:sldId id="260" r:id="rId4"/>
     <p:sldId id="262" r:id="rId5"/>
     <p:sldId id="261" r:id="rId6"/>
-    <p:sldId id="285" r:id="rId7"/>
-    <p:sldId id="263" r:id="rId8"/>
-    <p:sldId id="264" r:id="rId9"/>
-    <p:sldId id="265" r:id="rId10"/>
-    <p:sldId id="266" r:id="rId11"/>
-    <p:sldId id="267" r:id="rId12"/>
-    <p:sldId id="268" r:id="rId13"/>
+    <p:sldId id="263" r:id="rId7"/>
+    <p:sldId id="264" r:id="rId8"/>
+    <p:sldId id="265" r:id="rId9"/>
+    <p:sldId id="266" r:id="rId10"/>
+    <p:sldId id="267" r:id="rId11"/>
+    <p:sldId id="268" r:id="rId12"/>
+    <p:sldId id="287" r:id="rId13"/>
     <p:sldId id="269" r:id="rId14"/>
     <p:sldId id="270" r:id="rId15"/>
     <p:sldId id="272" r:id="rId16"/>
@@ -699,7 +699,7 @@
           <a:bodyPr/>
           <a:lstStyle/>
           <a:p>
-            <a:fld id="{79479AB7-61CF-48E3-A7BE-95954D99C11C}" type="datetime1">
+            <a:fld id="{9E684698-10D4-4307-9E95-E25BFDE38FC5}" type="datetime1">
               <a:rPr lang="fr-FR" smtClean="0"/>
               <a:t>08/06/2024</a:t>
             </a:fld>
@@ -867,7 +867,7 @@
           <a:bodyPr/>
           <a:lstStyle/>
           <a:p>
-            <a:fld id="{AB26CA7E-BB25-4159-813F-EEC0E137ACFE}" type="datetime1">
+            <a:fld id="{F04A3DE9-236D-4C95-BAB2-76B924A40FBE}" type="datetime1">
               <a:rPr lang="fr-FR" smtClean="0"/>
               <a:t>08/06/2024</a:t>
             </a:fld>
@@ -1045,7 +1045,7 @@
           <a:bodyPr/>
           <a:lstStyle/>
           <a:p>
-            <a:fld id="{7B41B395-FD2A-429F-896D-A074F385A12E}" type="datetime1">
+            <a:fld id="{1149BB9B-B773-4ED5-A8A4-C412110DC35B}" type="datetime1">
               <a:rPr lang="fr-FR" smtClean="0"/>
               <a:t>08/06/2024</a:t>
             </a:fld>
@@ -1213,7 +1213,7 @@
           <a:bodyPr/>
           <a:lstStyle/>
           <a:p>
-            <a:fld id="{79DA0F35-CE08-4A46-96BF-A5BB3C8DEC9F}" type="datetime1">
+            <a:fld id="{FC56CB06-5B92-48E2-BF22-BB15536C25C7}" type="datetime1">
               <a:rPr lang="fr-FR" smtClean="0"/>
               <a:t>08/06/2024</a:t>
             </a:fld>
@@ -1458,7 +1458,7 @@
           <a:bodyPr/>
           <a:lstStyle/>
           <a:p>
-            <a:fld id="{B1EF5238-A34E-45A8-9EDF-AA3D8312B876}" type="datetime1">
+            <a:fld id="{D7C4051C-34BD-4A81-BFAA-6A5DAC42CA23}" type="datetime1">
               <a:rPr lang="fr-FR" smtClean="0"/>
               <a:t>08/06/2024</a:t>
             </a:fld>
@@ -1687,7 +1687,7 @@
           <a:bodyPr/>
           <a:lstStyle/>
           <a:p>
-            <a:fld id="{FB1B2711-3353-4B96-9400-99918A178215}" type="datetime1">
+            <a:fld id="{9280BD7E-44E2-4DB6-BA59-A9AE6787EDA1}" type="datetime1">
               <a:rPr lang="fr-FR" smtClean="0"/>
               <a:t>08/06/2024</a:t>
             </a:fld>
@@ -2051,7 +2051,7 @@
           <a:bodyPr/>
           <a:lstStyle/>
           <a:p>
-            <a:fld id="{D0784885-9562-4587-9B38-B0A86FA11DC8}" type="datetime1">
+            <a:fld id="{A4E52DEF-0337-4736-B9B0-2A1DEA261F14}" type="datetime1">
               <a:rPr lang="fr-FR" smtClean="0"/>
               <a:t>08/06/2024</a:t>
             </a:fld>
@@ -2168,7 +2168,7 @@
           <a:bodyPr/>
           <a:lstStyle/>
           <a:p>
-            <a:fld id="{D012715E-0FF1-4C90-BF36-5D132CC66135}" type="datetime1">
+            <a:fld id="{BAFD9A09-053F-4C2D-862B-157637A48DEF}" type="datetime1">
               <a:rPr lang="fr-FR" smtClean="0"/>
               <a:t>08/06/2024</a:t>
             </a:fld>
@@ -2263,7 +2263,7 @@
           <a:bodyPr/>
           <a:lstStyle/>
           <a:p>
-            <a:fld id="{3EAE3FA9-3614-4389-AF70-49C2F7C662DE}" type="datetime1">
+            <a:fld id="{F2542A05-A105-43D4-A1FC-2E779A2FF0A3}" type="datetime1">
               <a:rPr lang="fr-FR" smtClean="0"/>
               <a:t>08/06/2024</a:t>
             </a:fld>
@@ -2538,7 +2538,7 @@
           <a:bodyPr/>
           <a:lstStyle/>
           <a:p>
-            <a:fld id="{80B2F412-96AC-4A8E-BC1B-9C9D63DC472F}" type="datetime1">
+            <a:fld id="{E7FA68D9-FB95-4ED6-9D9A-AD68979A83B4}" type="datetime1">
               <a:rPr lang="fr-FR" smtClean="0"/>
               <a:t>08/06/2024</a:t>
             </a:fld>
@@ -2790,7 +2790,7 @@
           <a:bodyPr/>
           <a:lstStyle/>
           <a:p>
-            <a:fld id="{5A7F0B1E-B93B-4DD9-BE80-ED3303C206B0}" type="datetime1">
+            <a:fld id="{000C8BE9-1690-4C7A-8D87-1E3588CA6C33}" type="datetime1">
               <a:rPr lang="fr-FR" smtClean="0"/>
               <a:t>08/06/2024</a:t>
             </a:fld>
@@ -3001,7 +3001,7 @@
             </a:lvl1pPr>
           </a:lstStyle>
           <a:p>
-            <a:fld id="{64584BD8-F425-437A-B3D4-60A73B57126C}" type="datetime1">
+            <a:fld id="{3D8F705C-7021-48CE-BB49-3E6C55897987}" type="datetime1">
               <a:rPr lang="fr-FR" smtClean="0"/>
               <a:t>08/06/2024</a:t>
             </a:fld>
@@ -3442,8 +3442,8 @@
         </p:blipFill>
         <p:spPr>
           <a:xfrm>
-            <a:off x="0" y="3724866"/>
-            <a:ext cx="5540479" cy="3133134"/>
+            <a:off x="1" y="4797350"/>
+            <a:ext cx="3643952" cy="2060650"/>
           </a:xfrm>
           <a:prstGeom prst="rect">
             <a:avLst/>
@@ -3505,7 +3505,7 @@
         </p:nvSpPr>
         <p:spPr>
           <a:xfrm>
-            <a:off x="1542615" y="1182254"/>
+            <a:off x="1524000" y="1919653"/>
             <a:ext cx="9144000" cy="1810471"/>
           </a:xfrm>
         </p:spPr>
@@ -3534,7 +3534,7 @@
         </p:nvSpPr>
         <p:spPr>
           <a:xfrm>
-            <a:off x="4330700" y="450113"/>
+            <a:off x="4330842" y="806362"/>
             <a:ext cx="3567545" cy="732141"/>
           </a:xfrm>
         </p:spPr>
@@ -3872,6 +3872,42 @@
           <a:chExt cx="0" cy="0"/>
         </a:xfrm>
       </p:grpSpPr>
+      <p:pic>
+        <p:nvPicPr>
+          <p:cNvPr id="15" name="Image 14">
+            <a:extLst>
+              <a:ext uri="{FF2B5EF4-FFF2-40B4-BE49-F238E27FC236}">
+                <a16:creationId xmlns:a16="http://schemas.microsoft.com/office/drawing/2014/main" id="{C0109303-2121-FE50-E83B-40EB772EED55}"/>
+              </a:ext>
+            </a:extLst>
+          </p:cNvPr>
+          <p:cNvPicPr>
+            <a:picLocks noChangeAspect="1"/>
+          </p:cNvPicPr>
+          <p:nvPr/>
+        </p:nvPicPr>
+        <p:blipFill>
+          <a:blip r:embed="rId2">
+            <a:extLst>
+              <a:ext uri="{28A0092B-C50C-407E-A947-70E740481C1C}">
+                <a14:useLocalDpi xmlns:a14="http://schemas.microsoft.com/office/drawing/2010/main" val="0"/>
+              </a:ext>
+            </a:extLst>
+          </a:blip>
+          <a:stretch>
+            <a:fillRect/>
+          </a:stretch>
+        </p:blipFill>
+        <p:spPr>
+          <a:xfrm>
+            <a:off x="7951088" y="-5109"/>
+            <a:ext cx="4205882" cy="4229151"/>
+          </a:xfrm>
+          <a:prstGeom prst="rect">
+            <a:avLst/>
+          </a:prstGeom>
+        </p:spPr>
+      </p:pic>
       <p:sp>
         <p:nvSpPr>
           <p:cNvPr id="27" name="Google Shape;222;p34"/>
@@ -3884,8 +3920,8 @@
         </p:nvSpPr>
         <p:spPr>
           <a:xfrm>
-            <a:off x="346366" y="3028210"/>
-            <a:ext cx="4359564" cy="1642185"/>
+            <a:off x="185131" y="2837710"/>
+            <a:ext cx="3752147" cy="1642185"/>
           </a:xfrm>
           <a:prstGeom prst="rect">
             <a:avLst/>
@@ -3912,7 +3948,7 @@
                   <a:srgbClr val="002060"/>
                 </a:solidFill>
               </a:rPr>
-              <a:t>Diagramme du Use Case personnel</a:t>
+              <a:t>Diagramme  d’exigence</a:t>
             </a:r>
             <a:endParaRPr sz="5400" b="1" dirty="0">
               <a:solidFill>
@@ -3931,7 +3967,7 @@
           <p:nvPr/>
         </p:nvPicPr>
         <p:blipFill>
-          <a:blip r:embed="rId2" cstate="print">
+          <a:blip r:embed="rId3" cstate="print">
             <a:extLst>
               <a:ext uri="{28A0092B-C50C-407E-A947-70E740481C1C}">
                 <a14:useLocalDpi xmlns:a14="http://schemas.microsoft.com/office/drawing/2010/main" val="0"/>
@@ -3965,16 +4001,115 @@
           </a:effectLst>
         </p:spPr>
       </p:pic>
+      <p:cxnSp>
+        <p:nvCxnSpPr>
+          <p:cNvPr id="7" name="Connecteur droit 6"/>
+          <p:cNvCxnSpPr/>
+          <p:nvPr/>
+        </p:nvCxnSpPr>
+        <p:spPr>
+          <a:xfrm>
+            <a:off x="7959169" y="-5109"/>
+            <a:ext cx="2540" cy="6858000"/>
+          </a:xfrm>
+          <a:prstGeom prst="line">
+            <a:avLst/>
+          </a:prstGeom>
+          <a:ln>
+            <a:solidFill>
+              <a:schemeClr val="tx1"/>
+            </a:solidFill>
+          </a:ln>
+        </p:spPr>
+        <p:style>
+          <a:lnRef idx="2">
+            <a:schemeClr val="accent2"/>
+          </a:lnRef>
+          <a:fillRef idx="0">
+            <a:schemeClr val="accent2"/>
+          </a:fillRef>
+          <a:effectRef idx="1">
+            <a:schemeClr val="accent2"/>
+          </a:effectRef>
+          <a:fontRef idx="minor">
+            <a:schemeClr val="tx1"/>
+          </a:fontRef>
+        </p:style>
+      </p:cxnSp>
+      <p:cxnSp>
+        <p:nvCxnSpPr>
+          <p:cNvPr id="10" name="Connecteur droit 9"/>
+          <p:cNvCxnSpPr/>
+          <p:nvPr/>
+        </p:nvCxnSpPr>
+        <p:spPr>
+          <a:xfrm>
+            <a:off x="7986118" y="-5109"/>
+            <a:ext cx="2540" cy="6858000"/>
+          </a:xfrm>
+          <a:prstGeom prst="line">
+            <a:avLst/>
+          </a:prstGeom>
+          <a:ln>
+            <a:solidFill>
+              <a:schemeClr val="tx1"/>
+            </a:solidFill>
+          </a:ln>
+        </p:spPr>
+        <p:style>
+          <a:lnRef idx="2">
+            <a:schemeClr val="accent2"/>
+          </a:lnRef>
+          <a:fillRef idx="0">
+            <a:schemeClr val="accent2"/>
+          </a:fillRef>
+          <a:effectRef idx="1">
+            <a:schemeClr val="accent2"/>
+          </a:effectRef>
+          <a:fontRef idx="minor">
+            <a:schemeClr val="tx1"/>
+          </a:fontRef>
+        </p:style>
+      </p:cxnSp>
+      <p:sp>
+        <p:nvSpPr>
+          <p:cNvPr id="3" name="Espace réservé du numéro de diapositive 2"/>
+          <p:cNvSpPr>
+            <a:spLocks noGrp="1"/>
+          </p:cNvSpPr>
+          <p:nvPr>
+            <p:ph type="sldNum" sz="quarter" idx="12"/>
+          </p:nvPr>
+        </p:nvSpPr>
+        <p:spPr/>
+        <p:txBody>
+          <a:bodyPr/>
+          <a:lstStyle/>
+          <a:p>
+            <a:fld id="{5B7114E8-7C5A-4E0D-8412-C2486C50547C}" type="slidenum">
+              <a:rPr lang="fr-FR" smtClean="0"/>
+              <a:t>10</a:t>
+            </a:fld>
+            <a:endParaRPr lang="fr-FR"/>
+          </a:p>
+        </p:txBody>
+      </p:sp>
       <p:pic>
         <p:nvPicPr>
-          <p:cNvPr id="2" name="Image 1"/>
+          <p:cNvPr id="4" name="Image 3">
+            <a:extLst>
+              <a:ext uri="{FF2B5EF4-FFF2-40B4-BE49-F238E27FC236}">
+                <a16:creationId xmlns:a16="http://schemas.microsoft.com/office/drawing/2014/main" id="{7FF70C10-3567-D92D-793D-41A48FA52C26}"/>
+              </a:ext>
+            </a:extLst>
+          </p:cNvPr>
           <p:cNvPicPr>
             <a:picLocks noChangeAspect="1"/>
           </p:cNvPicPr>
           <p:nvPr/>
         </p:nvPicPr>
         <p:blipFill>
-          <a:blip r:embed="rId3">
+          <a:blip r:embed="rId4">
             <a:extLst>
               <a:ext uri="{28A0092B-C50C-407E-A947-70E740481C1C}">
                 <a14:useLocalDpi xmlns:a14="http://schemas.microsoft.com/office/drawing/2010/main" val="0"/>
@@ -3987,127 +4122,18 @@
         </p:blipFill>
         <p:spPr>
           <a:xfrm>
-            <a:off x="4528602" y="127000"/>
-            <a:ext cx="7549098" cy="6613409"/>
+            <a:off x="3596221" y="99392"/>
+            <a:ext cx="4354867" cy="6758608"/>
           </a:xfrm>
           <a:prstGeom prst="rect">
             <a:avLst/>
           </a:prstGeom>
         </p:spPr>
       </p:pic>
-      <p:sp>
-        <p:nvSpPr>
-          <p:cNvPr id="4" name="Espace réservé du numéro de diapositive 3"/>
-          <p:cNvSpPr>
-            <a:spLocks noGrp="1"/>
-          </p:cNvSpPr>
-          <p:nvPr>
-            <p:ph type="sldNum" sz="quarter" idx="12"/>
-          </p:nvPr>
-        </p:nvSpPr>
-        <p:spPr/>
-        <p:txBody>
-          <a:bodyPr/>
-          <a:lstStyle/>
-          <a:p>
-            <a:fld id="{5B7114E8-7C5A-4E0D-8412-C2486C50547C}" type="slidenum">
-              <a:rPr lang="fr-FR" smtClean="0"/>
-              <a:t>10</a:t>
-            </a:fld>
-            <a:endParaRPr lang="fr-FR"/>
-          </a:p>
-        </p:txBody>
-      </p:sp>
-      <p:cxnSp>
-        <p:nvCxnSpPr>
-          <p:cNvPr id="3" name="Connecteur droit 2">
-            <a:extLst>
-              <a:ext uri="{FF2B5EF4-FFF2-40B4-BE49-F238E27FC236}">
-                <a16:creationId xmlns:a16="http://schemas.microsoft.com/office/drawing/2014/main" id="{259DB7A9-1AF6-F70C-C7D2-4D04EDE332F3}"/>
-              </a:ext>
-            </a:extLst>
-          </p:cNvPr>
-          <p:cNvCxnSpPr>
-            <a:cxnSpLocks/>
-          </p:cNvCxnSpPr>
-          <p:nvPr/>
-        </p:nvCxnSpPr>
-        <p:spPr>
-          <a:xfrm>
-            <a:off x="-351183" y="3895419"/>
-            <a:ext cx="2477163" cy="3221661"/>
-          </a:xfrm>
-          <a:prstGeom prst="line">
-            <a:avLst/>
-          </a:prstGeom>
-          <a:ln>
-            <a:solidFill>
-              <a:srgbClr val="0029C3"/>
-            </a:solidFill>
-          </a:ln>
-        </p:spPr>
-        <p:style>
-          <a:lnRef idx="3">
-            <a:schemeClr val="dk1"/>
-          </a:lnRef>
-          <a:fillRef idx="0">
-            <a:schemeClr val="dk1"/>
-          </a:fillRef>
-          <a:effectRef idx="2">
-            <a:schemeClr val="dk1"/>
-          </a:effectRef>
-          <a:fontRef idx="minor">
-            <a:schemeClr val="tx1"/>
-          </a:fontRef>
-        </p:style>
-      </p:cxnSp>
-      <p:cxnSp>
-        <p:nvCxnSpPr>
-          <p:cNvPr id="5" name="Connecteur droit 4">
-            <a:extLst>
-              <a:ext uri="{FF2B5EF4-FFF2-40B4-BE49-F238E27FC236}">
-                <a16:creationId xmlns:a16="http://schemas.microsoft.com/office/drawing/2014/main" id="{8160E5CF-0199-24D8-8DDB-B8CCBCD5E790}"/>
-              </a:ext>
-            </a:extLst>
-          </p:cNvPr>
-          <p:cNvCxnSpPr>
-            <a:cxnSpLocks/>
-          </p:cNvCxnSpPr>
-          <p:nvPr/>
-        </p:nvCxnSpPr>
-        <p:spPr>
-          <a:xfrm flipV="1">
-            <a:off x="-351183" y="-426720"/>
-            <a:ext cx="1471323" cy="3855720"/>
-          </a:xfrm>
-          <a:prstGeom prst="line">
-            <a:avLst/>
-          </a:prstGeom>
-          <a:ln>
-            <a:solidFill>
-              <a:srgbClr val="0029C3"/>
-            </a:solidFill>
-          </a:ln>
-        </p:spPr>
-        <p:style>
-          <a:lnRef idx="3">
-            <a:schemeClr val="dk1"/>
-          </a:lnRef>
-          <a:fillRef idx="0">
-            <a:schemeClr val="dk1"/>
-          </a:fillRef>
-          <a:effectRef idx="2">
-            <a:schemeClr val="dk1"/>
-          </a:effectRef>
-          <a:fontRef idx="minor">
-            <a:schemeClr val="tx1"/>
-          </a:fontRef>
-        </p:style>
-      </p:cxnSp>
     </p:spTree>
     <p:extLst>
       <p:ext uri="{BB962C8B-B14F-4D97-AF65-F5344CB8AC3E}">
-        <p14:creationId xmlns:p14="http://schemas.microsoft.com/office/powerpoint/2010/main" val="1878234036"/>
+        <p14:creationId xmlns:p14="http://schemas.microsoft.com/office/powerpoint/2010/main" val="4271636558"/>
       </p:ext>
     </p:extLst>
   </p:cSld>
@@ -4174,7 +4200,7 @@
                   <a:srgbClr val="002060"/>
                 </a:solidFill>
               </a:rPr>
-              <a:t>Diagramme  d’exigence</a:t>
+              <a:t>Diagramme  de classe</a:t>
             </a:r>
             <a:endParaRPr sz="5400" b="1" dirty="0">
               <a:solidFill>
@@ -4227,9 +4253,87 @@
           </a:effectLst>
         </p:spPr>
       </p:pic>
+      <p:sp>
+        <p:nvSpPr>
+          <p:cNvPr id="4" name="Espace réservé du numéro de diapositive 3"/>
+          <p:cNvSpPr>
+            <a:spLocks noGrp="1"/>
+          </p:cNvSpPr>
+          <p:nvPr>
+            <p:ph type="sldNum" sz="quarter" idx="12"/>
+          </p:nvPr>
+        </p:nvSpPr>
+        <p:spPr/>
+        <p:txBody>
+          <a:bodyPr/>
+          <a:lstStyle/>
+          <a:p>
+            <a:fld id="{5B7114E8-7C5A-4E0D-8412-C2486C50547C}" type="slidenum">
+              <a:rPr lang="fr-FR" smtClean="0"/>
+              <a:t>11</a:t>
+            </a:fld>
+            <a:endParaRPr lang="fr-FR"/>
+          </a:p>
+        </p:txBody>
+      </p:sp>
+      <p:sp>
+        <p:nvSpPr>
+          <p:cNvPr id="5" name="Éclair 4">
+            <a:extLst>
+              <a:ext uri="{FF2B5EF4-FFF2-40B4-BE49-F238E27FC236}">
+                <a16:creationId xmlns:a16="http://schemas.microsoft.com/office/drawing/2014/main" id="{BCB8C7B2-FA72-7EF9-C7A3-3D7C4082A436}"/>
+              </a:ext>
+            </a:extLst>
+          </p:cNvPr>
+          <p:cNvSpPr/>
+          <p:nvPr/>
+        </p:nvSpPr>
+        <p:spPr>
+          <a:xfrm rot="8247812">
+            <a:off x="-840309" y="-2333193"/>
+            <a:ext cx="2930939" cy="4163931"/>
+          </a:xfrm>
+          <a:prstGeom prst="lightningBolt">
+            <a:avLst/>
+          </a:prstGeom>
+          <a:solidFill>
+            <a:srgbClr val="0029C3"/>
+          </a:solidFill>
+        </p:spPr>
+        <p:style>
+          <a:lnRef idx="2">
+            <a:schemeClr val="accent1">
+              <a:shade val="15000"/>
+            </a:schemeClr>
+          </a:lnRef>
+          <a:fillRef idx="1">
+            <a:schemeClr val="accent1"/>
+          </a:fillRef>
+          <a:effectRef idx="0">
+            <a:schemeClr val="accent1"/>
+          </a:effectRef>
+          <a:fontRef idx="minor">
+            <a:schemeClr val="lt1"/>
+          </a:fontRef>
+        </p:style>
+        <p:txBody>
+          <a:bodyPr rtlCol="0" anchor="ctr"/>
+          <a:lstStyle/>
+          <a:p>
+            <a:pPr algn="ctr"/>
+            <a:endParaRPr lang="fr-FR"/>
+          </a:p>
+        </p:txBody>
+      </p:sp>
       <p:pic>
         <p:nvPicPr>
-          <p:cNvPr id="5" name="Image 4"/>
+          <p:cNvPr id="8" name="Image 7">
+            <a:extLst>
+              <a:ext uri="{FF2B5EF4-FFF2-40B4-BE49-F238E27FC236}">
+                <a16:creationId xmlns:a16="http://schemas.microsoft.com/office/drawing/2014/main" id="{31FFD1CB-CC79-7D88-1290-090713CC5BA7}"/>
+              </a:ext>
+            </a:extLst>
+          </p:cNvPr>
           <p:cNvPicPr>
             <a:picLocks noChangeAspect="1"/>
           </p:cNvPicPr>
@@ -4243,145 +4347,23 @@
               </a:ext>
             </a:extLst>
           </a:blip>
-          <a:srcRect r="76629" b="66351"/>
+          <a:srcRect t="19285" r="71862"/>
           <a:stretch/>
         </p:blipFill>
         <p:spPr>
           <a:xfrm>
-            <a:off x="4098513" y="635000"/>
-            <a:ext cx="3683848" cy="5857182"/>
+            <a:off x="3912358" y="16834"/>
+            <a:ext cx="6630537" cy="6841166"/>
           </a:xfrm>
           <a:prstGeom prst="rect">
             <a:avLst/>
           </a:prstGeom>
         </p:spPr>
       </p:pic>
-      <p:pic>
-        <p:nvPicPr>
-          <p:cNvPr id="6" name="Image 5"/>
-          <p:cNvPicPr>
-            <a:picLocks noChangeAspect="1"/>
-          </p:cNvPicPr>
-          <p:nvPr/>
-        </p:nvPicPr>
-        <p:blipFill rotWithShape="1">
-          <a:blip r:embed="rId3">
-            <a:extLst>
-              <a:ext uri="{28A0092B-C50C-407E-A947-70E740481C1C}">
-                <a14:useLocalDpi xmlns:a14="http://schemas.microsoft.com/office/drawing/2010/main" val="0"/>
-              </a:ext>
-            </a:extLst>
-          </a:blip>
-          <a:srcRect t="34250" r="75923" b="34826"/>
-          <a:stretch/>
-        </p:blipFill>
-        <p:spPr>
-          <a:xfrm>
-            <a:off x="8359697" y="1422400"/>
-            <a:ext cx="3832303" cy="5435600"/>
-          </a:xfrm>
-          <a:prstGeom prst="rect">
-            <a:avLst/>
-          </a:prstGeom>
-        </p:spPr>
-      </p:pic>
-      <p:cxnSp>
-        <p:nvCxnSpPr>
-          <p:cNvPr id="7" name="Connecteur droit 6"/>
-          <p:cNvCxnSpPr/>
-          <p:nvPr/>
-        </p:nvCxnSpPr>
-        <p:spPr>
-          <a:xfrm>
-            <a:off x="7959169" y="-5109"/>
-            <a:ext cx="2540" cy="6858000"/>
-          </a:xfrm>
-          <a:prstGeom prst="line">
-            <a:avLst/>
-          </a:prstGeom>
-          <a:ln>
-            <a:solidFill>
-              <a:schemeClr val="tx1"/>
-            </a:solidFill>
-          </a:ln>
-        </p:spPr>
-        <p:style>
-          <a:lnRef idx="2">
-            <a:schemeClr val="accent2"/>
-          </a:lnRef>
-          <a:fillRef idx="0">
-            <a:schemeClr val="accent2"/>
-          </a:fillRef>
-          <a:effectRef idx="1">
-            <a:schemeClr val="accent2"/>
-          </a:effectRef>
-          <a:fontRef idx="minor">
-            <a:schemeClr val="tx1"/>
-          </a:fontRef>
-        </p:style>
-      </p:cxnSp>
-      <p:cxnSp>
-        <p:nvCxnSpPr>
-          <p:cNvPr id="10" name="Connecteur droit 9"/>
-          <p:cNvCxnSpPr/>
-          <p:nvPr/>
-        </p:nvCxnSpPr>
-        <p:spPr>
-          <a:xfrm>
-            <a:off x="7986118" y="-5109"/>
-            <a:ext cx="2540" cy="6858000"/>
-          </a:xfrm>
-          <a:prstGeom prst="line">
-            <a:avLst/>
-          </a:prstGeom>
-          <a:ln>
-            <a:solidFill>
-              <a:schemeClr val="tx1"/>
-            </a:solidFill>
-          </a:ln>
-        </p:spPr>
-        <p:style>
-          <a:lnRef idx="2">
-            <a:schemeClr val="accent2"/>
-          </a:lnRef>
-          <a:fillRef idx="0">
-            <a:schemeClr val="accent2"/>
-          </a:fillRef>
-          <a:effectRef idx="1">
-            <a:schemeClr val="accent2"/>
-          </a:effectRef>
-          <a:fontRef idx="minor">
-            <a:schemeClr val="tx1"/>
-          </a:fontRef>
-        </p:style>
-      </p:cxnSp>
-      <p:sp>
-        <p:nvSpPr>
-          <p:cNvPr id="3" name="Espace réservé du numéro de diapositive 2"/>
-          <p:cNvSpPr>
-            <a:spLocks noGrp="1"/>
-          </p:cNvSpPr>
-          <p:nvPr>
-            <p:ph type="sldNum" sz="quarter" idx="12"/>
-          </p:nvPr>
-        </p:nvSpPr>
-        <p:spPr/>
-        <p:txBody>
-          <a:bodyPr/>
-          <a:lstStyle/>
-          <a:p>
-            <a:fld id="{5B7114E8-7C5A-4E0D-8412-C2486C50547C}" type="slidenum">
-              <a:rPr lang="fr-FR" smtClean="0"/>
-              <a:t>11</a:t>
-            </a:fld>
-            <a:endParaRPr lang="fr-FR"/>
-          </a:p>
-        </p:txBody>
-      </p:sp>
     </p:spTree>
     <p:extLst>
       <p:ext uri="{BB962C8B-B14F-4D97-AF65-F5344CB8AC3E}">
-        <p14:creationId xmlns:p14="http://schemas.microsoft.com/office/powerpoint/2010/main" val="4271636558"/>
+        <p14:creationId xmlns:p14="http://schemas.microsoft.com/office/powerpoint/2010/main" val="3338431040"/>
       </p:ext>
     </p:extLst>
   </p:cSld>
@@ -4420,7 +4402,7 @@
         </p:nvSpPr>
         <p:spPr>
           <a:xfrm>
-            <a:off x="244766" y="2837710"/>
+            <a:off x="5776186" y="136525"/>
             <a:ext cx="3752147" cy="1642185"/>
           </a:xfrm>
           <a:prstGeom prst="rect">
@@ -4501,35 +4483,6 @@
           </a:effectLst>
         </p:spPr>
       </p:pic>
-      <p:pic>
-        <p:nvPicPr>
-          <p:cNvPr id="3" name="Image 2"/>
-          <p:cNvPicPr>
-            <a:picLocks noChangeAspect="1"/>
-          </p:cNvPicPr>
-          <p:nvPr/>
-        </p:nvPicPr>
-        <p:blipFill rotWithShape="1">
-          <a:blip r:embed="rId3">
-            <a:extLst>
-              <a:ext uri="{28A0092B-C50C-407E-A947-70E740481C1C}">
-                <a14:useLocalDpi xmlns:a14="http://schemas.microsoft.com/office/drawing/2010/main" val="0"/>
-              </a:ext>
-            </a:extLst>
-          </a:blip>
-          <a:srcRect t="6907"/>
-          <a:stretch/>
-        </p:blipFill>
-        <p:spPr>
-          <a:xfrm>
-            <a:off x="4167739" y="-20538"/>
-            <a:ext cx="7921592" cy="6905479"/>
-          </a:xfrm>
-          <a:prstGeom prst="rect">
-            <a:avLst/>
-          </a:prstGeom>
-        </p:spPr>
-      </p:pic>
       <p:sp>
         <p:nvSpPr>
           <p:cNvPr id="4" name="Espace réservé du numéro de diapositive 3"/>
@@ -4602,10 +4555,45 @@
           </a:p>
         </p:txBody>
       </p:sp>
+      <p:pic>
+        <p:nvPicPr>
+          <p:cNvPr id="6" name="Image 5">
+            <a:extLst>
+              <a:ext uri="{FF2B5EF4-FFF2-40B4-BE49-F238E27FC236}">
+                <a16:creationId xmlns:a16="http://schemas.microsoft.com/office/drawing/2014/main" id="{A1BA07CD-7116-B97E-D08F-B5620D07A66B}"/>
+              </a:ext>
+            </a:extLst>
+          </p:cNvPr>
+          <p:cNvPicPr>
+            <a:picLocks noChangeAspect="1"/>
+          </p:cNvPicPr>
+          <p:nvPr/>
+        </p:nvPicPr>
+        <p:blipFill rotWithShape="1">
+          <a:blip r:embed="rId3">
+            <a:extLst>
+              <a:ext uri="{28A0092B-C50C-407E-A947-70E740481C1C}">
+                <a14:useLocalDpi xmlns:a14="http://schemas.microsoft.com/office/drawing/2010/main" val="0"/>
+              </a:ext>
+            </a:extLst>
+          </a:blip>
+          <a:srcRect l="29944" t="21912" r="1" b="2772"/>
+          <a:stretch/>
+        </p:blipFill>
+        <p:spPr>
+          <a:xfrm>
+            <a:off x="0" y="1777726"/>
+            <a:ext cx="12192000" cy="4714456"/>
+          </a:xfrm>
+          <a:prstGeom prst="rect">
+            <a:avLst/>
+          </a:prstGeom>
+        </p:spPr>
+      </p:pic>
     </p:spTree>
     <p:extLst>
       <p:ext uri="{BB962C8B-B14F-4D97-AF65-F5344CB8AC3E}">
-        <p14:creationId xmlns:p14="http://schemas.microsoft.com/office/powerpoint/2010/main" val="3338431040"/>
+        <p14:creationId xmlns:p14="http://schemas.microsoft.com/office/powerpoint/2010/main" val="2822952809"/>
       </p:ext>
     </p:extLst>
   </p:cSld>
@@ -4725,9 +4713,38 @@
           </a:effectLst>
         </p:spPr>
       </p:pic>
+      <p:sp>
+        <p:nvSpPr>
+          <p:cNvPr id="4" name="Espace réservé du numéro de diapositive 3"/>
+          <p:cNvSpPr>
+            <a:spLocks noGrp="1"/>
+          </p:cNvSpPr>
+          <p:nvPr>
+            <p:ph type="sldNum" sz="quarter" idx="12"/>
+          </p:nvPr>
+        </p:nvSpPr>
+        <p:spPr/>
+        <p:txBody>
+          <a:bodyPr/>
+          <a:lstStyle/>
+          <a:p>
+            <a:fld id="{5B7114E8-7C5A-4E0D-8412-C2486C50547C}" type="slidenum">
+              <a:rPr lang="fr-FR" smtClean="0"/>
+              <a:t>13</a:t>
+            </a:fld>
+            <a:endParaRPr lang="fr-FR"/>
+          </a:p>
+        </p:txBody>
+      </p:sp>
       <p:pic>
         <p:nvPicPr>
-          <p:cNvPr id="2" name="Image 1"/>
+          <p:cNvPr id="7" name="Image 6">
+            <a:extLst>
+              <a:ext uri="{FF2B5EF4-FFF2-40B4-BE49-F238E27FC236}">
+                <a16:creationId xmlns:a16="http://schemas.microsoft.com/office/drawing/2014/main" id="{AA60454D-1542-5682-CAC8-1462981CA906}"/>
+              </a:ext>
+            </a:extLst>
+          </p:cNvPr>
           <p:cNvPicPr>
             <a:picLocks noChangeAspect="1"/>
           </p:cNvPicPr>
@@ -4741,42 +4758,19 @@
               </a:ext>
             </a:extLst>
           </a:blip>
-          <a:srcRect t="25077"/>
+          <a:srcRect t="30186"/>
           <a:stretch/>
         </p:blipFill>
         <p:spPr>
           <a:xfrm>
-            <a:off x="3851959" y="856649"/>
-            <a:ext cx="8245847" cy="5172374"/>
+            <a:off x="3872560" y="980661"/>
+            <a:ext cx="8081570" cy="4638262"/>
           </a:xfrm>
           <a:prstGeom prst="rect">
             <a:avLst/>
           </a:prstGeom>
         </p:spPr>
       </p:pic>
-      <p:sp>
-        <p:nvSpPr>
-          <p:cNvPr id="4" name="Espace réservé du numéro de diapositive 3"/>
-          <p:cNvSpPr>
-            <a:spLocks noGrp="1"/>
-          </p:cNvSpPr>
-          <p:nvPr>
-            <p:ph type="sldNum" sz="quarter" idx="12"/>
-          </p:nvPr>
-        </p:nvSpPr>
-        <p:spPr/>
-        <p:txBody>
-          <a:bodyPr/>
-          <a:lstStyle/>
-          <a:p>
-            <a:fld id="{5B7114E8-7C5A-4E0D-8412-C2486C50547C}" type="slidenum">
-              <a:rPr lang="fr-FR" smtClean="0"/>
-              <a:t>13</a:t>
-            </a:fld>
-            <a:endParaRPr lang="fr-FR"/>
-          </a:p>
-        </p:txBody>
-      </p:sp>
     </p:spTree>
     <p:extLst>
       <p:ext uri="{BB962C8B-B14F-4D97-AF65-F5344CB8AC3E}">
@@ -11057,7 +11051,13 @@
             </a:pPr>
             <a:r>
               <a:rPr lang="en" sz="5400" b="1" dirty="0">
-                <a:hlinkClick r:id="rId2"/>
+                <a:hlinkClick r:id="rId2">
+                  <a:extLst>
+                    <a:ext uri="{A12FA001-AC4F-418D-AE19-62706E023703}">
+                      <ahyp:hlinkClr xmlns:ahyp="http://schemas.microsoft.com/office/drawing/2018/hyperlinkcolor" val="tx"/>
+                    </a:ext>
+                  </a:extLst>
+                </a:hlinkClick>
               </a:rPr>
               <a:t>TRELLO</a:t>
             </a:r>
@@ -11644,10 +11644,10 @@
               <a:buSzPts val="1100"/>
             </a:pPr>
             <a:r>
-              <a:rPr lang="fr-FR" sz="1200" dirty="0">
+              <a:rPr lang="fr-FR" sz="1800" dirty="0">
                 <a:latin typeface="+mj-lt"/>
               </a:rPr>
-              <a:t>- Imprimer : cahier de recette + synoptique + diagramme déploiement + manuel d’utilisation (de tout le monde) + (scénario ?)</a:t>
+              <a:t>- Imprimer : cahier de recette + synoptique + diagramme déploiement + manuel d’utilisation (de tout le monde) + les 2 convocations</a:t>
             </a:r>
           </a:p>
           <a:p>
@@ -11656,88 +11656,9 @@
                 <a:schemeClr val="lt1"/>
               </a:buClr>
               <a:buSzPts val="1100"/>
-              <a:buNone/>
             </a:pPr>
             <a:r>
-              <a:rPr lang="fr-FR" sz="1200" dirty="0">
-                <a:latin typeface="+mj-lt"/>
-              </a:rPr>
-              <a:t>- Faire </a:t>
-            </a:r>
-            <a:r>
-              <a:rPr lang="fr-FR" sz="1200" dirty="0" err="1">
-                <a:latin typeface="+mj-lt"/>
-              </a:rPr>
-              <a:t>gantt</a:t>
-            </a:r>
-            <a:r>
-              <a:rPr lang="fr-FR" sz="1200" dirty="0">
-                <a:latin typeface="+mj-lt"/>
-              </a:rPr>
-              <a:t> + </a:t>
-            </a:r>
-            <a:r>
-              <a:rPr lang="fr-FR" sz="1200" dirty="0" err="1">
-                <a:latin typeface="+mj-lt"/>
-              </a:rPr>
-              <a:t>gantt</a:t>
-            </a:r>
-            <a:r>
-              <a:rPr lang="fr-FR" sz="1200" dirty="0">
-                <a:latin typeface="+mj-lt"/>
-              </a:rPr>
-              <a:t> </a:t>
-            </a:r>
-            <a:r>
-              <a:rPr lang="fr-FR" sz="1200" dirty="0" err="1">
-                <a:latin typeface="+mj-lt"/>
-              </a:rPr>
-              <a:t>prévi</a:t>
-            </a:r>
-            <a:r>
-              <a:rPr lang="fr-FR" sz="1200" dirty="0">
-                <a:latin typeface="+mj-lt"/>
-              </a:rPr>
-              <a:t> (que du perso)</a:t>
-            </a:r>
-          </a:p>
-          <a:p>
-            <a:pPr marL="0" lvl="0" indent="0">
-              <a:buClr>
-                <a:schemeClr val="lt1"/>
-              </a:buClr>
-              <a:buSzPts val="1100"/>
-              <a:buNone/>
-            </a:pPr>
-            <a:r>
-              <a:rPr lang="fr-FR" sz="1200" dirty="0">
-                <a:latin typeface="+mj-lt"/>
-              </a:rPr>
-              <a:t>- </a:t>
-            </a:r>
-            <a:r>
-              <a:rPr lang="fr-FR" sz="1200" dirty="0" err="1">
-                <a:latin typeface="+mj-lt"/>
-              </a:rPr>
-              <a:t>Modif</a:t>
-            </a:r>
-            <a:r>
-              <a:rPr lang="fr-FR" sz="1200" dirty="0">
-                <a:latin typeface="+mj-lt"/>
-              </a:rPr>
-              <a:t> diagramme de classe</a:t>
-            </a:r>
-          </a:p>
-          <a:p>
-            <a:pPr marL="0" lvl="0" indent="0">
-              <a:buClr>
-                <a:schemeClr val="lt1"/>
-              </a:buClr>
-              <a:buSzPts val="1100"/>
-              <a:buNone/>
-            </a:pPr>
-            <a:r>
-              <a:rPr lang="fr-FR" sz="1200" dirty="0">
+              <a:rPr lang="fr-FR" sz="1800" dirty="0">
                 <a:latin typeface="+mj-lt"/>
               </a:rPr>
               <a:t>- Nommer les fichiers des modules de tests</a:t>
@@ -13771,275 +13692,6 @@
       </p:grpSpPr>
       <p:sp>
         <p:nvSpPr>
-          <p:cNvPr id="19" name="Google Shape;222;p34"/>
-          <p:cNvSpPr txBox="1">
-            <a:spLocks noGrp="1"/>
-          </p:cNvSpPr>
-          <p:nvPr>
-            <p:ph type="subTitle" idx="4294967295"/>
-          </p:nvPr>
-        </p:nvSpPr>
-        <p:spPr>
-          <a:xfrm>
-            <a:off x="3104769" y="2988588"/>
-            <a:ext cx="5982462" cy="880824"/>
-          </a:xfrm>
-          <a:prstGeom prst="rect">
-            <a:avLst/>
-          </a:prstGeom>
-        </p:spPr>
-        <p:txBody>
-          <a:bodyPr spcFirstLastPara="1" wrap="square" lIns="91425" tIns="91425" rIns="91425" bIns="91425" anchor="b" anchorCtr="0">
-            <a:noAutofit/>
-          </a:bodyPr>
-          <a:lstStyle/>
-          <a:p>
-            <a:pPr marL="0" lvl="0" indent="0" algn="l" rtl="0">
-              <a:spcBef>
-                <a:spcPts val="0"/>
-              </a:spcBef>
-              <a:spcAft>
-                <a:spcPts val="0"/>
-              </a:spcAft>
-              <a:buNone/>
-            </a:pPr>
-            <a:r>
-              <a:rPr lang="en" sz="5400" b="1" dirty="0"/>
-              <a:t>GANTT prévisionnel</a:t>
-            </a:r>
-            <a:endParaRPr sz="5400" b="1" dirty="0"/>
-          </a:p>
-        </p:txBody>
-      </p:sp>
-      <p:pic>
-        <p:nvPicPr>
-          <p:cNvPr id="6" name="Image 5"/>
-          <p:cNvPicPr>
-            <a:picLocks noChangeAspect="1"/>
-          </p:cNvPicPr>
-          <p:nvPr/>
-        </p:nvPicPr>
-        <p:blipFill>
-          <a:blip r:embed="rId2" cstate="print">
-            <a:extLst>
-              <a:ext uri="{28A0092B-C50C-407E-A947-70E740481C1C}">
-                <a14:useLocalDpi xmlns:a14="http://schemas.microsoft.com/office/drawing/2010/main" val="0"/>
-              </a:ext>
-            </a:extLst>
-          </a:blip>
-          <a:stretch>
-            <a:fillRect/>
-          </a:stretch>
-        </p:blipFill>
-        <p:spPr>
-          <a:xfrm>
-            <a:off x="120073" y="6492182"/>
-            <a:ext cx="1477818" cy="248227"/>
-          </a:xfrm>
-          <a:prstGeom prst="rect">
-            <a:avLst/>
-          </a:prstGeom>
-          <a:effectLst>
-            <a:glow rad="127000">
-              <a:schemeClr val="accent1">
-                <a:alpha val="0"/>
-              </a:schemeClr>
-            </a:glow>
-            <a:outerShdw blurRad="50800" dist="50800" dir="5400000" algn="ctr" rotWithShape="0">
-              <a:srgbClr val="000000">
-                <a:alpha val="0"/>
-              </a:srgbClr>
-            </a:outerShdw>
-            <a:reflection endPos="65000" dist="50800" dir="5400000" sy="-100000" algn="bl" rotWithShape="0"/>
-          </a:effectLst>
-        </p:spPr>
-      </p:pic>
-      <p:sp>
-        <p:nvSpPr>
-          <p:cNvPr id="3" name="Espace réservé du numéro de diapositive 2"/>
-          <p:cNvSpPr>
-            <a:spLocks noGrp="1"/>
-          </p:cNvSpPr>
-          <p:nvPr>
-            <p:ph type="sldNum" sz="quarter" idx="12"/>
-          </p:nvPr>
-        </p:nvSpPr>
-        <p:spPr/>
-        <p:txBody>
-          <a:bodyPr/>
-          <a:lstStyle/>
-          <a:p>
-            <a:fld id="{5B7114E8-7C5A-4E0D-8412-C2486C50547C}" type="slidenum">
-              <a:rPr lang="fr-FR" smtClean="0"/>
-              <a:t>6</a:t>
-            </a:fld>
-            <a:endParaRPr lang="fr-FR"/>
-          </a:p>
-        </p:txBody>
-      </p:sp>
-      <p:sp>
-        <p:nvSpPr>
-          <p:cNvPr id="2" name="Rectangle : avec coin arrondi et coin rogné en haut 1">
-            <a:extLst>
-              <a:ext uri="{FF2B5EF4-FFF2-40B4-BE49-F238E27FC236}">
-                <a16:creationId xmlns:a16="http://schemas.microsoft.com/office/drawing/2014/main" id="{DAABC2B6-540A-AE8A-6A29-190631D5C3CF}"/>
-              </a:ext>
-            </a:extLst>
-          </p:cNvPr>
-          <p:cNvSpPr/>
-          <p:nvPr/>
-        </p:nvSpPr>
-        <p:spPr>
-          <a:xfrm rot="8249702">
-            <a:off x="-701040" y="-420624"/>
-            <a:ext cx="2773680" cy="2074188"/>
-          </a:xfrm>
-          <a:prstGeom prst="snipRoundRect">
-            <a:avLst/>
-          </a:prstGeom>
-          <a:solidFill>
-            <a:srgbClr val="0029C3"/>
-          </a:solidFill>
-        </p:spPr>
-        <p:style>
-          <a:lnRef idx="2">
-            <a:schemeClr val="accent1">
-              <a:shade val="15000"/>
-            </a:schemeClr>
-          </a:lnRef>
-          <a:fillRef idx="1">
-            <a:schemeClr val="accent1"/>
-          </a:fillRef>
-          <a:effectRef idx="0">
-            <a:schemeClr val="accent1"/>
-          </a:effectRef>
-          <a:fontRef idx="minor">
-            <a:schemeClr val="lt1"/>
-          </a:fontRef>
-        </p:style>
-        <p:txBody>
-          <a:bodyPr rtlCol="0" anchor="ctr"/>
-          <a:lstStyle/>
-          <a:p>
-            <a:pPr algn="ctr"/>
-            <a:endParaRPr lang="fr-FR"/>
-          </a:p>
-        </p:txBody>
-      </p:sp>
-      <p:cxnSp>
-        <p:nvCxnSpPr>
-          <p:cNvPr id="4" name="Connecteur droit 3">
-            <a:extLst>
-              <a:ext uri="{FF2B5EF4-FFF2-40B4-BE49-F238E27FC236}">
-                <a16:creationId xmlns:a16="http://schemas.microsoft.com/office/drawing/2014/main" id="{0B4694BE-FA88-677E-C17A-D972960776DF}"/>
-              </a:ext>
-            </a:extLst>
-          </p:cNvPr>
-          <p:cNvCxnSpPr/>
-          <p:nvPr/>
-        </p:nvCxnSpPr>
-        <p:spPr>
-          <a:xfrm>
-            <a:off x="7443903" y="-258618"/>
-            <a:ext cx="5099686" cy="4540323"/>
-          </a:xfrm>
-          <a:prstGeom prst="line">
-            <a:avLst/>
-          </a:prstGeom>
-          <a:ln>
-            <a:solidFill>
-              <a:srgbClr val="0029C3"/>
-            </a:solidFill>
-          </a:ln>
-        </p:spPr>
-        <p:style>
-          <a:lnRef idx="3">
-            <a:schemeClr val="dk1"/>
-          </a:lnRef>
-          <a:fillRef idx="0">
-            <a:schemeClr val="dk1"/>
-          </a:fillRef>
-          <a:effectRef idx="2">
-            <a:schemeClr val="dk1"/>
-          </a:effectRef>
-          <a:fontRef idx="minor">
-            <a:schemeClr val="tx1"/>
-          </a:fontRef>
-        </p:style>
-      </p:cxnSp>
-      <p:cxnSp>
-        <p:nvCxnSpPr>
-          <p:cNvPr id="5" name="Connecteur droit 4">
-            <a:extLst>
-              <a:ext uri="{FF2B5EF4-FFF2-40B4-BE49-F238E27FC236}">
-                <a16:creationId xmlns:a16="http://schemas.microsoft.com/office/drawing/2014/main" id="{7C4E0261-DA30-BF5C-AA62-2F08C2E10FBE}"/>
-              </a:ext>
-            </a:extLst>
-          </p:cNvPr>
-          <p:cNvCxnSpPr/>
-          <p:nvPr/>
-        </p:nvCxnSpPr>
-        <p:spPr>
-          <a:xfrm flipV="1">
-            <a:off x="9361054" y="4964545"/>
-            <a:ext cx="3182535" cy="2650926"/>
-          </a:xfrm>
-          <a:prstGeom prst="line">
-            <a:avLst/>
-          </a:prstGeom>
-          <a:ln>
-            <a:solidFill>
-              <a:srgbClr val="0029C3"/>
-            </a:solidFill>
-          </a:ln>
-        </p:spPr>
-        <p:style>
-          <a:lnRef idx="3">
-            <a:schemeClr val="dk1"/>
-          </a:lnRef>
-          <a:fillRef idx="0">
-            <a:schemeClr val="dk1"/>
-          </a:fillRef>
-          <a:effectRef idx="2">
-            <a:schemeClr val="dk1"/>
-          </a:effectRef>
-          <a:fontRef idx="minor">
-            <a:schemeClr val="tx1"/>
-          </a:fontRef>
-        </p:style>
-      </p:cxnSp>
-    </p:spTree>
-    <p:extLst>
-      <p:ext uri="{BB962C8B-B14F-4D97-AF65-F5344CB8AC3E}">
-        <p14:creationId xmlns:p14="http://schemas.microsoft.com/office/powerpoint/2010/main" val="1573474146"/>
-      </p:ext>
-    </p:extLst>
-  </p:cSld>
-  <p:clrMapOvr>
-    <a:masterClrMapping/>
-  </p:clrMapOvr>
-</p:sld>
-</file>
-
-<file path=ppt/slides/slide7.xml><?xml version="1.0" encoding="utf-8"?>
-<p:sld xmlns:a="http://schemas.openxmlformats.org/drawingml/2006/main" xmlns:r="http://schemas.openxmlformats.org/officeDocument/2006/relationships" xmlns:p="http://schemas.openxmlformats.org/presentationml/2006/main">
-  <p:cSld>
-    <p:spTree>
-      <p:nvGrpSpPr>
-        <p:cNvPr id="1" name=""/>
-        <p:cNvGrpSpPr/>
-        <p:nvPr/>
-      </p:nvGrpSpPr>
-      <p:grpSpPr>
-        <a:xfrm>
-          <a:off x="0" y="0"/>
-          <a:ext cx="0" cy="0"/>
-          <a:chOff x="0" y="0"/>
-          <a:chExt cx="0" cy="0"/>
-        </a:xfrm>
-      </p:grpSpPr>
-      <p:sp>
-        <p:nvSpPr>
           <p:cNvPr id="27" name="Google Shape;222;p34"/>
           <p:cNvSpPr txBox="1">
             <a:spLocks noGrp="1"/>
@@ -14177,7 +13829,7 @@
           <a:p>
             <a:fld id="{5B7114E8-7C5A-4E0D-8412-C2486C50547C}" type="slidenum">
               <a:rPr lang="fr-FR" smtClean="0"/>
-              <a:t>7</a:t>
+              <a:t>6</a:t>
             </a:fld>
             <a:endParaRPr lang="fr-FR"/>
           </a:p>
@@ -14237,7 +13889,7 @@
 </p:sld>
 </file>
 
-<file path=ppt/slides/slide8.xml><?xml version="1.0" encoding="utf-8"?>
+<file path=ppt/slides/slide7.xml><?xml version="1.0" encoding="utf-8"?>
 <p:sld xmlns:a="http://schemas.openxmlformats.org/drawingml/2006/main" xmlns:r="http://schemas.openxmlformats.org/officeDocument/2006/relationships" xmlns:p="http://schemas.openxmlformats.org/presentationml/2006/main">
   <p:cSld>
     <p:spTree>
@@ -14551,7 +14203,7 @@
           <a:p>
             <a:fld id="{5B7114E8-7C5A-4E0D-8412-C2486C50547C}" type="slidenum">
               <a:rPr lang="fr-FR" smtClean="0"/>
-              <a:t>8</a:t>
+              <a:t>7</a:t>
             </a:fld>
             <a:endParaRPr lang="fr-FR"/>
           </a:p>
@@ -14570,7 +14222,7 @@
 </p:sld>
 </file>
 
-<file path=ppt/slides/slide9.xml><?xml version="1.0" encoding="utf-8"?>
+<file path=ppt/slides/slide8.xml><?xml version="1.0" encoding="utf-8"?>
 <p:sld xmlns:a="http://schemas.openxmlformats.org/drawingml/2006/main" xmlns:r="http://schemas.openxmlformats.org/officeDocument/2006/relationships" xmlns:p="http://schemas.openxmlformats.org/presentationml/2006/main">
   <p:cSld>
     <p:spTree>
@@ -14773,7 +14425,7 @@
           <a:p>
             <a:fld id="{5B7114E8-7C5A-4E0D-8412-C2486C50547C}" type="slidenum">
               <a:rPr lang="fr-FR" smtClean="0"/>
-              <a:t>9</a:t>
+              <a:t>8</a:t>
             </a:fld>
             <a:endParaRPr lang="fr-FR"/>
           </a:p>
@@ -14869,6 +14521,268 @@
     <p:extLst>
       <p:ext uri="{BB962C8B-B14F-4D97-AF65-F5344CB8AC3E}">
         <p14:creationId xmlns:p14="http://schemas.microsoft.com/office/powerpoint/2010/main" val="3743747645"/>
+      </p:ext>
+    </p:extLst>
+  </p:cSld>
+  <p:clrMapOvr>
+    <a:masterClrMapping/>
+  </p:clrMapOvr>
+</p:sld>
+</file>
+
+<file path=ppt/slides/slide9.xml><?xml version="1.0" encoding="utf-8"?>
+<p:sld xmlns:a="http://schemas.openxmlformats.org/drawingml/2006/main" xmlns:r="http://schemas.openxmlformats.org/officeDocument/2006/relationships" xmlns:p="http://schemas.openxmlformats.org/presentationml/2006/main">
+  <p:cSld>
+    <p:spTree>
+      <p:nvGrpSpPr>
+        <p:cNvPr id="1" name=""/>
+        <p:cNvGrpSpPr/>
+        <p:nvPr/>
+      </p:nvGrpSpPr>
+      <p:grpSpPr>
+        <a:xfrm>
+          <a:off x="0" y="0"/>
+          <a:ext cx="0" cy="0"/>
+          <a:chOff x="0" y="0"/>
+          <a:chExt cx="0" cy="0"/>
+        </a:xfrm>
+      </p:grpSpPr>
+      <p:sp>
+        <p:nvSpPr>
+          <p:cNvPr id="27" name="Google Shape;222;p34"/>
+          <p:cNvSpPr txBox="1">
+            <a:spLocks noGrp="1"/>
+          </p:cNvSpPr>
+          <p:nvPr>
+            <p:ph type="subTitle" idx="4294967295"/>
+          </p:nvPr>
+        </p:nvSpPr>
+        <p:spPr>
+          <a:xfrm>
+            <a:off x="346366" y="3028210"/>
+            <a:ext cx="4359564" cy="1642185"/>
+          </a:xfrm>
+          <a:prstGeom prst="rect">
+            <a:avLst/>
+          </a:prstGeom>
+        </p:spPr>
+        <p:txBody>
+          <a:bodyPr spcFirstLastPara="1" wrap="square" lIns="91425" tIns="91425" rIns="91425" bIns="91425" anchor="b" anchorCtr="0">
+            <a:noAutofit/>
+          </a:bodyPr>
+          <a:lstStyle/>
+          <a:p>
+            <a:pPr marL="0" lvl="0" indent="0" algn="l" rtl="0">
+              <a:spcBef>
+                <a:spcPts val="0"/>
+              </a:spcBef>
+              <a:spcAft>
+                <a:spcPts val="0"/>
+              </a:spcAft>
+              <a:buNone/>
+            </a:pPr>
+            <a:r>
+              <a:rPr lang="en" sz="5400" b="1" dirty="0">
+                <a:solidFill>
+                  <a:srgbClr val="002060"/>
+                </a:solidFill>
+              </a:rPr>
+              <a:t>Diagramme du Use Case personnel</a:t>
+            </a:r>
+            <a:endParaRPr sz="5400" b="1" dirty="0">
+              <a:solidFill>
+                <a:srgbClr val="002060"/>
+              </a:solidFill>
+            </a:endParaRPr>
+          </a:p>
+        </p:txBody>
+      </p:sp>
+      <p:pic>
+        <p:nvPicPr>
+          <p:cNvPr id="13" name="Image 12"/>
+          <p:cNvPicPr>
+            <a:picLocks noChangeAspect="1"/>
+          </p:cNvPicPr>
+          <p:nvPr/>
+        </p:nvPicPr>
+        <p:blipFill>
+          <a:blip r:embed="rId2" cstate="print">
+            <a:extLst>
+              <a:ext uri="{28A0092B-C50C-407E-A947-70E740481C1C}">
+                <a14:useLocalDpi xmlns:a14="http://schemas.microsoft.com/office/drawing/2010/main" val="0"/>
+              </a:ext>
+            </a:extLst>
+          </a:blip>
+          <a:stretch>
+            <a:fillRect/>
+          </a:stretch>
+        </p:blipFill>
+        <p:spPr>
+          <a:xfrm>
+            <a:off x="120073" y="6492182"/>
+            <a:ext cx="1477818" cy="248227"/>
+          </a:xfrm>
+          <a:prstGeom prst="rect">
+            <a:avLst/>
+          </a:prstGeom>
+          <a:effectLst>
+            <a:glow rad="127000">
+              <a:schemeClr val="accent1">
+                <a:alpha val="0"/>
+              </a:schemeClr>
+            </a:glow>
+            <a:outerShdw blurRad="50800" dist="50800" dir="5400000" algn="ctr" rotWithShape="0">
+              <a:srgbClr val="000000">
+                <a:alpha val="0"/>
+              </a:srgbClr>
+            </a:outerShdw>
+            <a:reflection endPos="65000" dist="50800" dir="5400000" sy="-100000" algn="bl" rotWithShape="0"/>
+          </a:effectLst>
+        </p:spPr>
+      </p:pic>
+      <p:pic>
+        <p:nvPicPr>
+          <p:cNvPr id="2" name="Image 1"/>
+          <p:cNvPicPr>
+            <a:picLocks noChangeAspect="1"/>
+          </p:cNvPicPr>
+          <p:nvPr/>
+        </p:nvPicPr>
+        <p:blipFill>
+          <a:blip r:embed="rId3">
+            <a:extLst>
+              <a:ext uri="{28A0092B-C50C-407E-A947-70E740481C1C}">
+                <a14:useLocalDpi xmlns:a14="http://schemas.microsoft.com/office/drawing/2010/main" val="0"/>
+              </a:ext>
+            </a:extLst>
+          </a:blip>
+          <a:stretch>
+            <a:fillRect/>
+          </a:stretch>
+        </p:blipFill>
+        <p:spPr>
+          <a:xfrm>
+            <a:off x="4528602" y="127000"/>
+            <a:ext cx="7549098" cy="6613409"/>
+          </a:xfrm>
+          <a:prstGeom prst="rect">
+            <a:avLst/>
+          </a:prstGeom>
+        </p:spPr>
+      </p:pic>
+      <p:sp>
+        <p:nvSpPr>
+          <p:cNvPr id="4" name="Espace réservé du numéro de diapositive 3"/>
+          <p:cNvSpPr>
+            <a:spLocks noGrp="1"/>
+          </p:cNvSpPr>
+          <p:nvPr>
+            <p:ph type="sldNum" sz="quarter" idx="12"/>
+          </p:nvPr>
+        </p:nvSpPr>
+        <p:spPr/>
+        <p:txBody>
+          <a:bodyPr/>
+          <a:lstStyle/>
+          <a:p>
+            <a:fld id="{5B7114E8-7C5A-4E0D-8412-C2486C50547C}" type="slidenum">
+              <a:rPr lang="fr-FR" smtClean="0"/>
+              <a:t>9</a:t>
+            </a:fld>
+            <a:endParaRPr lang="fr-FR"/>
+          </a:p>
+        </p:txBody>
+      </p:sp>
+      <p:cxnSp>
+        <p:nvCxnSpPr>
+          <p:cNvPr id="3" name="Connecteur droit 2">
+            <a:extLst>
+              <a:ext uri="{FF2B5EF4-FFF2-40B4-BE49-F238E27FC236}">
+                <a16:creationId xmlns:a16="http://schemas.microsoft.com/office/drawing/2014/main" id="{259DB7A9-1AF6-F70C-C7D2-4D04EDE332F3}"/>
+              </a:ext>
+            </a:extLst>
+          </p:cNvPr>
+          <p:cNvCxnSpPr>
+            <a:cxnSpLocks/>
+          </p:cNvCxnSpPr>
+          <p:nvPr/>
+        </p:nvCxnSpPr>
+        <p:spPr>
+          <a:xfrm>
+            <a:off x="-351183" y="3895419"/>
+            <a:ext cx="2477163" cy="3221661"/>
+          </a:xfrm>
+          <a:prstGeom prst="line">
+            <a:avLst/>
+          </a:prstGeom>
+          <a:ln>
+            <a:solidFill>
+              <a:srgbClr val="0029C3"/>
+            </a:solidFill>
+          </a:ln>
+        </p:spPr>
+        <p:style>
+          <a:lnRef idx="3">
+            <a:schemeClr val="dk1"/>
+          </a:lnRef>
+          <a:fillRef idx="0">
+            <a:schemeClr val="dk1"/>
+          </a:fillRef>
+          <a:effectRef idx="2">
+            <a:schemeClr val="dk1"/>
+          </a:effectRef>
+          <a:fontRef idx="minor">
+            <a:schemeClr val="tx1"/>
+          </a:fontRef>
+        </p:style>
+      </p:cxnSp>
+      <p:cxnSp>
+        <p:nvCxnSpPr>
+          <p:cNvPr id="5" name="Connecteur droit 4">
+            <a:extLst>
+              <a:ext uri="{FF2B5EF4-FFF2-40B4-BE49-F238E27FC236}">
+                <a16:creationId xmlns:a16="http://schemas.microsoft.com/office/drawing/2014/main" id="{8160E5CF-0199-24D8-8DDB-B8CCBCD5E790}"/>
+              </a:ext>
+            </a:extLst>
+          </p:cNvPr>
+          <p:cNvCxnSpPr>
+            <a:cxnSpLocks/>
+          </p:cNvCxnSpPr>
+          <p:nvPr/>
+        </p:nvCxnSpPr>
+        <p:spPr>
+          <a:xfrm flipV="1">
+            <a:off x="-351183" y="-426720"/>
+            <a:ext cx="1471323" cy="3855720"/>
+          </a:xfrm>
+          <a:prstGeom prst="line">
+            <a:avLst/>
+          </a:prstGeom>
+          <a:ln>
+            <a:solidFill>
+              <a:srgbClr val="0029C3"/>
+            </a:solidFill>
+          </a:ln>
+        </p:spPr>
+        <p:style>
+          <a:lnRef idx="3">
+            <a:schemeClr val="dk1"/>
+          </a:lnRef>
+          <a:fillRef idx="0">
+            <a:schemeClr val="dk1"/>
+          </a:fillRef>
+          <a:effectRef idx="2">
+            <a:schemeClr val="dk1"/>
+          </a:effectRef>
+          <a:fontRef idx="minor">
+            <a:schemeClr val="tx1"/>
+          </a:fontRef>
+        </p:style>
+      </p:cxnSp>
+    </p:spTree>
+    <p:extLst>
+      <p:ext uri="{BB962C8B-B14F-4D97-AF65-F5344CB8AC3E}">
+        <p14:creationId xmlns:p14="http://schemas.microsoft.com/office/powerpoint/2010/main" val="1878234036"/>
       </p:ext>
     </p:extLst>
   </p:cSld>

</xml_diff>